<commit_message>
move ToDo app folder
</commit_message>
<xml_diff>
--- a/week-04/day-4/w4demo.pptx
+++ b/week-04/day-4/w4demo.pptx
@@ -3588,21 +3588,8 @@
                   <a:srgbClr val="FFFF00"/>
                 </a:solidFill>
               </a:rPr>
-              <a:t> </a:t>
+              <a:t> 4</a:t>
             </a:r>
-            <a:r>
-              <a:rPr lang="hu-HU" sz="6000" b="1" dirty="0" smtClean="0">
-                <a:solidFill>
-                  <a:srgbClr val="FFFF00"/>
-                </a:solidFill>
-              </a:rPr>
-              <a:t>4</a:t>
-            </a:r>
-            <a:endParaRPr lang="hu-HU" sz="6000" b="1" dirty="0" smtClean="0">
-              <a:solidFill>
-                <a:srgbClr val="FFFF00"/>
-              </a:solidFill>
-            </a:endParaRPr>
           </a:p>
         </p:txBody>
       </p:sp>
@@ -4200,11 +4187,6 @@
               </a:rPr>
               <a:t>4</a:t>
             </a:r>
-            <a:endParaRPr lang="hu-HU" sz="1350" b="1" dirty="0">
-              <a:solidFill>
-                <a:srgbClr val="FF0000"/>
-              </a:solidFill>
-            </a:endParaRPr>
           </a:p>
         </p:txBody>
       </p:sp>
@@ -4368,11 +4350,7 @@
             <a:pPr algn="ctr"/>
             <a:r>
               <a:rPr lang="hu-HU" sz="4400" b="1" dirty="0" err="1" smtClean="0"/>
-              <a:t>S</a:t>
-            </a:r>
-            <a:r>
-              <a:rPr lang="hu-HU" sz="4400" b="1" dirty="0" err="1" smtClean="0"/>
-              <a:t>ize</a:t>
+              <a:t>Size</a:t>
             </a:r>
             <a:r>
               <a:rPr lang="hu-HU" sz="4400" b="1" dirty="0" smtClean="0"/>
@@ -5634,11 +5612,6 @@
               </a:rPr>
               <a:t>4</a:t>
             </a:r>
-            <a:endParaRPr lang="hu-HU" sz="1350" b="1" dirty="0">
-              <a:solidFill>
-                <a:srgbClr val="FF0000"/>
-              </a:solidFill>
-            </a:endParaRPr>
           </a:p>
         </p:txBody>
       </p:sp>
@@ -14671,16 +14644,12 @@
               </a:rPr>
               <a:t>()</a:t>
             </a:r>
-            <a:endParaRPr lang="hu-HU" sz="3600" b="1" dirty="0" smtClean="0">
-              <a:latin typeface="+mj-lt"/>
-              <a:cs typeface="Consolas" panose="020B0609020204030204" pitchFamily="49" charset="0"/>
-            </a:endParaRPr>
           </a:p>
         </p:txBody>
       </p:sp>
       <p:pic>
         <p:nvPicPr>
-          <p:cNvPr id="1026" name="Picture 2" descr="cool story bro house - ONE DOES NOT SIMPLY GO HOME WITHOUT A TAKE HOME MESSAGE"/>
+          <p:cNvPr id="2" name="Picture 2" descr="Képtalálat a következőre: „take home message”"/>
           <p:cNvPicPr>
             <a:picLocks noChangeAspect="1" noChangeArrowheads="1"/>
           </p:cNvPicPr>
@@ -14701,8 +14670,8 @@
         </p:blipFill>
         <p:spPr bwMode="auto">
           <a:xfrm>
-            <a:off x="5004048" y="2408282"/>
-            <a:ext cx="3539421" cy="4045054"/>
+            <a:off x="4860032" y="3348173"/>
+            <a:ext cx="3974579" cy="3177171"/>
           </a:xfrm>
           <a:prstGeom prst="rect">
             <a:avLst/>
@@ -15000,21 +14969,8 @@
                   <a:schemeClr val="bg1"/>
                 </a:solidFill>
               </a:rPr>
-              <a:t>András </a:t>
+              <a:t>András Pásztor</a:t>
             </a:r>
-            <a:r>
-              <a:rPr lang="hu-HU" sz="3200" b="1" dirty="0" smtClean="0">
-                <a:solidFill>
-                  <a:schemeClr val="bg1"/>
-                </a:solidFill>
-              </a:rPr>
-              <a:t>Pásztor</a:t>
-            </a:r>
-            <a:endParaRPr lang="hu-HU" sz="3200" b="1" dirty="0" smtClean="0">
-              <a:solidFill>
-                <a:schemeClr val="bg1"/>
-              </a:solidFill>
-            </a:endParaRPr>
           </a:p>
         </p:txBody>
       </p:sp>

</xml_diff>